<commit_message>
Reorganize repo, add user inputs file, udpate PPT
</commit_message>
<xml_diff>
--- a/presentations/Update_2019-06-18.pptx
+++ b/presentations/Update_2019-06-18.pptx
@@ -7,8 +7,11 @@
   <p:sldIdLst>
     <p:sldId id="256" r:id="rId2"/>
     <p:sldId id="258" r:id="rId3"/>
-    <p:sldId id="257" r:id="rId4"/>
+    <p:sldId id="263" r:id="rId4"/>
     <p:sldId id="259" r:id="rId5"/>
+    <p:sldId id="260" r:id="rId6"/>
+    <p:sldId id="261" r:id="rId7"/>
+    <p:sldId id="262" r:id="rId8"/>
   </p:sldIdLst>
   <p:sldSz cx="12192000" cy="6858000"/>
   <p:notesSz cx="6858000" cy="9144000"/>
@@ -3641,7 +3644,178 @@
           <a:p>
             <a:r>
               <a:rPr lang="en-US" dirty="0"/>
-              <a:t>Shortest path algorithm</a:t>
+              <a:t>User inputs to shortest path</a:t>
+            </a:r>
+            <a:endParaRPr lang="en-AT" dirty="0"/>
+          </a:p>
+        </p:txBody>
+      </p:sp>
+      <p:pic>
+        <p:nvPicPr>
+          <p:cNvPr id="7" name="Picture 6">
+            <a:extLst>
+              <a:ext uri="{FF2B5EF4-FFF2-40B4-BE49-F238E27FC236}">
+                <a16:creationId xmlns:a16="http://schemas.microsoft.com/office/drawing/2014/main" id="{41BC1EBF-27A5-4035-BA2D-0989C33FE50D}"/>
+              </a:ext>
+            </a:extLst>
+          </p:cNvPr>
+          <p:cNvPicPr>
+            <a:picLocks noChangeAspect="1"/>
+          </p:cNvPicPr>
+          <p:nvPr/>
+        </p:nvPicPr>
+        <p:blipFill>
+          <a:blip r:embed="rId2"/>
+          <a:stretch>
+            <a:fillRect/>
+          </a:stretch>
+        </p:blipFill>
+        <p:spPr>
+          <a:xfrm>
+            <a:off x="293914" y="1770106"/>
+            <a:ext cx="11604171" cy="1506006"/>
+          </a:xfrm>
+          <a:prstGeom prst="rect">
+            <a:avLst/>
+          </a:prstGeom>
+        </p:spPr>
+      </p:pic>
+      <p:pic>
+        <p:nvPicPr>
+          <p:cNvPr id="8" name="Picture 7">
+            <a:extLst>
+              <a:ext uri="{FF2B5EF4-FFF2-40B4-BE49-F238E27FC236}">
+                <a16:creationId xmlns:a16="http://schemas.microsoft.com/office/drawing/2014/main" id="{87528D55-E75E-4FE3-8645-573B3C29DF06}"/>
+              </a:ext>
+            </a:extLst>
+          </p:cNvPr>
+          <p:cNvPicPr>
+            <a:picLocks noChangeAspect="1"/>
+          </p:cNvPicPr>
+          <p:nvPr/>
+        </p:nvPicPr>
+        <p:blipFill>
+          <a:blip r:embed="rId3"/>
+          <a:stretch>
+            <a:fillRect/>
+          </a:stretch>
+        </p:blipFill>
+        <p:spPr>
+          <a:xfrm>
+            <a:off x="3133724" y="3649382"/>
+            <a:ext cx="5721027" cy="1296889"/>
+          </a:xfrm>
+          <a:prstGeom prst="rect">
+            <a:avLst/>
+          </a:prstGeom>
+        </p:spPr>
+      </p:pic>
+      <p:sp>
+        <p:nvSpPr>
+          <p:cNvPr id="9" name="TextBox 8">
+            <a:extLst>
+              <a:ext uri="{FF2B5EF4-FFF2-40B4-BE49-F238E27FC236}">
+                <a16:creationId xmlns:a16="http://schemas.microsoft.com/office/drawing/2014/main" id="{ED694E59-A05E-4953-9047-E84424568E40}"/>
+              </a:ext>
+            </a:extLst>
+          </p:cNvPr>
+          <p:cNvSpPr txBox="1"/>
+          <p:nvPr/>
+        </p:nvSpPr>
+        <p:spPr>
+          <a:xfrm>
+            <a:off x="3576751" y="5709479"/>
+            <a:ext cx="5038495" cy="369332"/>
+          </a:xfrm>
+          <a:prstGeom prst="rect">
+            <a:avLst/>
+          </a:prstGeom>
+          <a:noFill/>
+        </p:spPr>
+        <p:txBody>
+          <a:bodyPr wrap="none" rtlCol="0">
+            <a:spAutoFit/>
+          </a:bodyPr>
+          <a:lstStyle/>
+          <a:p>
+            <a:r>
+              <a:rPr lang="en-US" dirty="0"/>
+              <a:t>From: </a:t>
+            </a:r>
+            <a:r>
+              <a:rPr lang="en-US" dirty="0" err="1"/>
+              <a:t>message_trade</a:t>
+            </a:r>
+            <a:r>
+              <a:rPr lang="en-US" dirty="0"/>
+              <a:t>/</a:t>
+            </a:r>
+            <a:r>
+              <a:rPr lang="en-US" dirty="0" err="1"/>
+              <a:t>user_inputs</a:t>
+            </a:r>
+            <a:r>
+              <a:rPr lang="en-US" dirty="0"/>
+              <a:t>/User_Inputs.xlsx</a:t>
+            </a:r>
+            <a:endParaRPr lang="en-AT" dirty="0"/>
+          </a:p>
+        </p:txBody>
+      </p:sp>
+    </p:spTree>
+    <p:extLst>
+      <p:ext uri="{BB962C8B-B14F-4D97-AF65-F5344CB8AC3E}">
+        <p14:creationId xmlns:p14="http://schemas.microsoft.com/office/powerpoint/2010/main" val="1829461285"/>
+      </p:ext>
+    </p:extLst>
+  </p:cSld>
+  <p:clrMapOvr>
+    <a:masterClrMapping/>
+  </p:clrMapOvr>
+</p:sld>
+</file>
+
+<file path=ppt/slides/slide4.xml><?xml version="1.0" encoding="utf-8"?>
+<p:sld xmlns:a="http://schemas.openxmlformats.org/drawingml/2006/main" xmlns:r="http://schemas.openxmlformats.org/officeDocument/2006/relationships" xmlns:p="http://schemas.openxmlformats.org/presentationml/2006/main">
+  <p:cSld>
+    <p:spTree>
+      <p:nvGrpSpPr>
+        <p:cNvPr id="1" name=""/>
+        <p:cNvGrpSpPr/>
+        <p:nvPr/>
+      </p:nvGrpSpPr>
+      <p:grpSpPr>
+        <a:xfrm>
+          <a:off x="0" y="0"/>
+          <a:ext cx="0" cy="0"/>
+          <a:chOff x="0" y="0"/>
+          <a:chExt cx="0" cy="0"/>
+        </a:xfrm>
+      </p:grpSpPr>
+      <p:sp>
+        <p:nvSpPr>
+          <p:cNvPr id="2" name="Title 1">
+            <a:extLst>
+              <a:ext uri="{FF2B5EF4-FFF2-40B4-BE49-F238E27FC236}">
+                <a16:creationId xmlns:a16="http://schemas.microsoft.com/office/drawing/2014/main" id="{7F497429-F8E1-451C-B6CC-5CB9761515B2}"/>
+              </a:ext>
+            </a:extLst>
+          </p:cNvPr>
+          <p:cNvSpPr>
+            <a:spLocks noGrp="1"/>
+          </p:cNvSpPr>
+          <p:nvPr>
+            <p:ph type="title"/>
+          </p:nvPr>
+        </p:nvSpPr>
+        <p:spPr/>
+        <p:txBody>
+          <a:bodyPr/>
+          <a:lstStyle/>
+          <a:p>
+            <a:r>
+              <a:rPr lang="en-US" dirty="0"/>
+              <a:t>Shortest path algorithm (detailed)</a:t>
             </a:r>
             <a:endParaRPr lang="en-AT" dirty="0"/>
           </a:p>
@@ -3764,742 +3938,8 @@
           </a:p>
         </p:txBody>
       </p:sp>
-      <p:sp>
-        <p:nvSpPr>
-          <p:cNvPr id="7" name="Rectangle 6">
-            <a:extLst>
-              <a:ext uri="{FF2B5EF4-FFF2-40B4-BE49-F238E27FC236}">
-                <a16:creationId xmlns:a16="http://schemas.microsoft.com/office/drawing/2014/main" id="{694D664D-DF24-40DB-A446-74C9372F5818}"/>
-              </a:ext>
-            </a:extLst>
-          </p:cNvPr>
-          <p:cNvSpPr/>
-          <p:nvPr/>
-        </p:nvSpPr>
-        <p:spPr>
-          <a:xfrm>
-            <a:off x="3661444" y="2086043"/>
-            <a:ext cx="1783011" cy="326824"/>
-          </a:xfrm>
-          <a:prstGeom prst="rect">
-            <a:avLst/>
-          </a:prstGeom>
-          <a:solidFill>
-            <a:schemeClr val="accent5">
-              <a:lumMod val="20000"/>
-              <a:lumOff val="80000"/>
-            </a:schemeClr>
-          </a:solidFill>
-          <a:ln>
-            <a:solidFill>
-              <a:schemeClr val="accent5">
-                <a:lumMod val="50000"/>
-              </a:schemeClr>
-            </a:solidFill>
-          </a:ln>
-        </p:spPr>
-        <p:style>
-          <a:lnRef idx="2">
-            <a:schemeClr val="accent1">
-              <a:shade val="50000"/>
-            </a:schemeClr>
-          </a:lnRef>
-          <a:fillRef idx="1">
-            <a:schemeClr val="accent1"/>
-          </a:fillRef>
-          <a:effectRef idx="0">
-            <a:schemeClr val="accent1"/>
-          </a:effectRef>
-          <a:fontRef idx="minor">
-            <a:schemeClr val="lt1"/>
-          </a:fontRef>
-        </p:style>
-        <p:txBody>
-          <a:bodyPr rtlCol="0" anchor="ctr"/>
-          <a:lstStyle/>
-          <a:p>
-            <a:r>
-              <a:rPr lang="en-US" sz="1200" b="1" dirty="0">
-                <a:ln w="0"/>
-                <a:solidFill>
-                  <a:schemeClr val="tx1"/>
-                </a:solidFill>
-              </a:rPr>
-              <a:t>Step 1: Node definition</a:t>
-            </a:r>
-          </a:p>
-        </p:txBody>
-      </p:sp>
-      <p:sp>
-        <p:nvSpPr>
-          <p:cNvPr id="8" name="Rectangle 7">
-            <a:extLst>
-              <a:ext uri="{FF2B5EF4-FFF2-40B4-BE49-F238E27FC236}">
-                <a16:creationId xmlns:a16="http://schemas.microsoft.com/office/drawing/2014/main" id="{68BF704F-8173-4EBD-A914-D854A4A19E7B}"/>
-              </a:ext>
-            </a:extLst>
-          </p:cNvPr>
-          <p:cNvSpPr/>
-          <p:nvPr/>
-        </p:nvSpPr>
-        <p:spPr>
-          <a:xfrm>
-            <a:off x="3627539" y="3099976"/>
-            <a:ext cx="1855713" cy="326825"/>
-          </a:xfrm>
-          <a:prstGeom prst="rect">
-            <a:avLst/>
-          </a:prstGeom>
-          <a:solidFill>
-            <a:schemeClr val="accent5">
-              <a:lumMod val="20000"/>
-              <a:lumOff val="80000"/>
-            </a:schemeClr>
-          </a:solidFill>
-          <a:ln>
-            <a:solidFill>
-              <a:schemeClr val="accent5">
-                <a:lumMod val="50000"/>
-              </a:schemeClr>
-            </a:solidFill>
-          </a:ln>
-        </p:spPr>
-        <p:style>
-          <a:lnRef idx="2">
-            <a:schemeClr val="accent1">
-              <a:shade val="50000"/>
-            </a:schemeClr>
-          </a:lnRef>
-          <a:fillRef idx="1">
-            <a:schemeClr val="accent1"/>
-          </a:fillRef>
-          <a:effectRef idx="0">
-            <a:schemeClr val="accent1"/>
-          </a:effectRef>
-          <a:fontRef idx="minor">
-            <a:schemeClr val="lt1"/>
-          </a:fontRef>
-        </p:style>
-        <p:txBody>
-          <a:bodyPr rtlCol="0" anchor="ctr"/>
-          <a:lstStyle/>
-          <a:p>
-            <a:r>
-              <a:rPr lang="en-US" sz="1200" b="1" dirty="0">
-                <a:ln w="0"/>
-                <a:solidFill>
-                  <a:schemeClr val="tx1"/>
-                </a:solidFill>
-              </a:rPr>
-              <a:t>Step 2: Calculate distance</a:t>
-            </a:r>
-          </a:p>
-        </p:txBody>
-      </p:sp>
-      <p:sp>
-        <p:nvSpPr>
-          <p:cNvPr id="9" name="Rectangle 8">
-            <a:extLst>
-              <a:ext uri="{FF2B5EF4-FFF2-40B4-BE49-F238E27FC236}">
-                <a16:creationId xmlns:a16="http://schemas.microsoft.com/office/drawing/2014/main" id="{068BB3F0-0962-47A9-87C3-5C3786FBD595}"/>
-              </a:ext>
-            </a:extLst>
-          </p:cNvPr>
-          <p:cNvSpPr/>
-          <p:nvPr/>
-        </p:nvSpPr>
-        <p:spPr>
-          <a:xfrm>
-            <a:off x="3405579" y="3922975"/>
-            <a:ext cx="2294739" cy="326824"/>
-          </a:xfrm>
-          <a:prstGeom prst="rect">
-            <a:avLst/>
-          </a:prstGeom>
-          <a:solidFill>
-            <a:schemeClr val="accent5">
-              <a:lumMod val="20000"/>
-              <a:lumOff val="80000"/>
-            </a:schemeClr>
-          </a:solidFill>
-          <a:ln>
-            <a:solidFill>
-              <a:schemeClr val="accent5">
-                <a:lumMod val="50000"/>
-              </a:schemeClr>
-            </a:solidFill>
-          </a:ln>
-        </p:spPr>
-        <p:style>
-          <a:lnRef idx="2">
-            <a:schemeClr val="accent1">
-              <a:shade val="50000"/>
-            </a:schemeClr>
-          </a:lnRef>
-          <a:fillRef idx="1">
-            <a:schemeClr val="accent1"/>
-          </a:fillRef>
-          <a:effectRef idx="0">
-            <a:schemeClr val="accent1"/>
-          </a:effectRef>
-          <a:fontRef idx="minor">
-            <a:schemeClr val="lt1"/>
-          </a:fontRef>
-        </p:style>
-        <p:txBody>
-          <a:bodyPr rtlCol="0" anchor="ctr"/>
-          <a:lstStyle/>
-          <a:p>
-            <a:r>
-              <a:rPr lang="en-US" sz="1200" b="1" dirty="0">
-                <a:ln w="0"/>
-                <a:solidFill>
-                  <a:schemeClr val="tx1"/>
-                </a:solidFill>
-              </a:rPr>
-              <a:t>Step 3: Floyd-</a:t>
-            </a:r>
-            <a:r>
-              <a:rPr lang="en-US" sz="1200" b="1" dirty="0" err="1">
-                <a:ln w="0"/>
-                <a:solidFill>
-                  <a:schemeClr val="tx1"/>
-                </a:solidFill>
-              </a:rPr>
-              <a:t>Warshall</a:t>
-            </a:r>
-            <a:r>
-              <a:rPr lang="en-US" sz="1200" b="1" dirty="0">
-                <a:ln w="0"/>
-                <a:solidFill>
-                  <a:schemeClr val="tx1"/>
-                </a:solidFill>
-              </a:rPr>
-              <a:t> Algorithm</a:t>
-            </a:r>
-          </a:p>
-        </p:txBody>
-      </p:sp>
-      <p:sp>
-        <p:nvSpPr>
-          <p:cNvPr id="10" name="Rectangle 9">
-            <a:extLst>
-              <a:ext uri="{FF2B5EF4-FFF2-40B4-BE49-F238E27FC236}">
-                <a16:creationId xmlns:a16="http://schemas.microsoft.com/office/drawing/2014/main" id="{0A83C2D6-C03D-4BD1-94A1-03D371B58EDF}"/>
-              </a:ext>
-            </a:extLst>
-          </p:cNvPr>
-          <p:cNvSpPr/>
-          <p:nvPr/>
-        </p:nvSpPr>
-        <p:spPr>
-          <a:xfrm>
-            <a:off x="3627539" y="4836089"/>
-            <a:ext cx="1858512" cy="326824"/>
-          </a:xfrm>
-          <a:prstGeom prst="rect">
-            <a:avLst/>
-          </a:prstGeom>
-          <a:solidFill>
-            <a:schemeClr val="accent5">
-              <a:lumMod val="20000"/>
-              <a:lumOff val="80000"/>
-            </a:schemeClr>
-          </a:solidFill>
-          <a:ln>
-            <a:solidFill>
-              <a:schemeClr val="accent5">
-                <a:lumMod val="50000"/>
-              </a:schemeClr>
-            </a:solidFill>
-          </a:ln>
-        </p:spPr>
-        <p:style>
-          <a:lnRef idx="2">
-            <a:schemeClr val="accent1">
-              <a:shade val="50000"/>
-            </a:schemeClr>
-          </a:lnRef>
-          <a:fillRef idx="1">
-            <a:schemeClr val="accent1"/>
-          </a:fillRef>
-          <a:effectRef idx="0">
-            <a:schemeClr val="accent1"/>
-          </a:effectRef>
-          <a:fontRef idx="minor">
-            <a:schemeClr val="lt1"/>
-          </a:fontRef>
-        </p:style>
-        <p:txBody>
-          <a:bodyPr rtlCol="0" anchor="ctr"/>
-          <a:lstStyle/>
-          <a:p>
-            <a:r>
-              <a:rPr lang="en-US" sz="1200" b="1" dirty="0">
-                <a:ln w="0"/>
-                <a:solidFill>
-                  <a:schemeClr val="tx1"/>
-                </a:solidFill>
-              </a:rPr>
-              <a:t>Step 4: Link to trade data</a:t>
-            </a:r>
-          </a:p>
-        </p:txBody>
-      </p:sp>
-      <p:sp>
-        <p:nvSpPr>
-          <p:cNvPr id="14" name="Rectangle 13">
-            <a:extLst>
-              <a:ext uri="{FF2B5EF4-FFF2-40B4-BE49-F238E27FC236}">
-                <a16:creationId xmlns:a16="http://schemas.microsoft.com/office/drawing/2014/main" id="{F6BFC429-3693-4B03-9680-184801D9C50E}"/>
-              </a:ext>
-            </a:extLst>
-          </p:cNvPr>
-          <p:cNvSpPr/>
-          <p:nvPr/>
-        </p:nvSpPr>
-        <p:spPr>
-          <a:xfrm>
-            <a:off x="8065492" y="2063630"/>
-            <a:ext cx="1921602" cy="326824"/>
-          </a:xfrm>
-          <a:prstGeom prst="rect">
-            <a:avLst/>
-          </a:prstGeom>
-          <a:solidFill>
-            <a:schemeClr val="accent4">
-              <a:lumMod val="20000"/>
-              <a:lumOff val="80000"/>
-            </a:schemeClr>
-          </a:solidFill>
-          <a:ln>
-            <a:solidFill>
-              <a:schemeClr val="accent4">
-                <a:lumMod val="50000"/>
-              </a:schemeClr>
-            </a:solidFill>
-          </a:ln>
-        </p:spPr>
-        <p:style>
-          <a:lnRef idx="2">
-            <a:schemeClr val="accent1">
-              <a:shade val="50000"/>
-            </a:schemeClr>
-          </a:lnRef>
-          <a:fillRef idx="1">
-            <a:schemeClr val="accent1"/>
-          </a:fillRef>
-          <a:effectRef idx="0">
-            <a:schemeClr val="accent1"/>
-          </a:effectRef>
-          <a:fontRef idx="minor">
-            <a:schemeClr val="lt1"/>
-          </a:fontRef>
-        </p:style>
-        <p:txBody>
-          <a:bodyPr rtlCol="0" anchor="ctr"/>
-          <a:lstStyle/>
-          <a:p>
-            <a:r>
-              <a:rPr lang="en-US" sz="1200" b="1" dirty="0">
-                <a:ln w="0"/>
-                <a:solidFill>
-                  <a:schemeClr val="tx1"/>
-                </a:solidFill>
-              </a:rPr>
-              <a:t>Step 5: Assign trade to port</a:t>
-            </a:r>
-          </a:p>
-        </p:txBody>
-      </p:sp>
-      <p:sp>
-        <p:nvSpPr>
-          <p:cNvPr id="15" name="Rectangle 14">
-            <a:extLst>
-              <a:ext uri="{FF2B5EF4-FFF2-40B4-BE49-F238E27FC236}">
-                <a16:creationId xmlns:a16="http://schemas.microsoft.com/office/drawing/2014/main" id="{135DC7A5-1097-4A69-9715-FADEF5117063}"/>
-              </a:ext>
-            </a:extLst>
-          </p:cNvPr>
-          <p:cNvSpPr/>
-          <p:nvPr/>
-        </p:nvSpPr>
-        <p:spPr>
-          <a:xfrm>
-            <a:off x="7681873" y="3073239"/>
-            <a:ext cx="2802446" cy="326824"/>
-          </a:xfrm>
-          <a:prstGeom prst="rect">
-            <a:avLst/>
-          </a:prstGeom>
-          <a:solidFill>
-            <a:schemeClr val="accent4">
-              <a:lumMod val="20000"/>
-              <a:lumOff val="80000"/>
-            </a:schemeClr>
-          </a:solidFill>
-          <a:ln>
-            <a:solidFill>
-              <a:schemeClr val="accent4">
-                <a:lumMod val="50000"/>
-              </a:schemeClr>
-            </a:solidFill>
-          </a:ln>
-        </p:spPr>
-        <p:style>
-          <a:lnRef idx="2">
-            <a:schemeClr val="accent1">
-              <a:shade val="50000"/>
-            </a:schemeClr>
-          </a:lnRef>
-          <a:fillRef idx="1">
-            <a:schemeClr val="accent1"/>
-          </a:fillRef>
-          <a:effectRef idx="0">
-            <a:schemeClr val="accent1"/>
-          </a:effectRef>
-          <a:fontRef idx="minor">
-            <a:schemeClr val="lt1"/>
-          </a:fontRef>
-        </p:style>
-        <p:txBody>
-          <a:bodyPr rtlCol="0" anchor="ctr"/>
-          <a:lstStyle/>
-          <a:p>
-            <a:r>
-              <a:rPr lang="en-US" sz="1200" b="1" dirty="0">
-                <a:ln w="0"/>
-                <a:solidFill>
-                  <a:schemeClr val="tx1"/>
-                </a:solidFill>
-              </a:rPr>
-              <a:t>Step 6: Calculate total trade to/from port</a:t>
-            </a:r>
-            <a:endParaRPr lang="en-US" sz="1200" dirty="0">
-              <a:ln w="0"/>
-              <a:solidFill>
-                <a:schemeClr val="tx1"/>
-              </a:solidFill>
-            </a:endParaRPr>
-          </a:p>
-        </p:txBody>
-      </p:sp>
-      <p:sp>
-        <p:nvSpPr>
-          <p:cNvPr id="17" name="Rectangle 16">
-            <a:extLst>
-              <a:ext uri="{FF2B5EF4-FFF2-40B4-BE49-F238E27FC236}">
-                <a16:creationId xmlns:a16="http://schemas.microsoft.com/office/drawing/2014/main" id="{B7BDC94B-B47C-40A7-955A-67546A0476A1}"/>
-              </a:ext>
-            </a:extLst>
-          </p:cNvPr>
-          <p:cNvSpPr/>
-          <p:nvPr/>
-        </p:nvSpPr>
-        <p:spPr>
-          <a:xfrm>
-            <a:off x="7464807" y="3935238"/>
-            <a:ext cx="3532288" cy="326824"/>
-          </a:xfrm>
-          <a:prstGeom prst="rect">
-            <a:avLst/>
-          </a:prstGeom>
-          <a:solidFill>
-            <a:schemeClr val="accent4">
-              <a:lumMod val="20000"/>
-              <a:lumOff val="80000"/>
-            </a:schemeClr>
-          </a:solidFill>
-          <a:ln>
-            <a:solidFill>
-              <a:schemeClr val="accent4">
-                <a:lumMod val="50000"/>
-              </a:schemeClr>
-            </a:solidFill>
-          </a:ln>
-        </p:spPr>
-        <p:style>
-          <a:lnRef idx="2">
-            <a:schemeClr val="accent1">
-              <a:shade val="50000"/>
-            </a:schemeClr>
-          </a:lnRef>
-          <a:fillRef idx="1">
-            <a:schemeClr val="accent1"/>
-          </a:fillRef>
-          <a:effectRef idx="0">
-            <a:schemeClr val="accent1"/>
-          </a:effectRef>
-          <a:fontRef idx="minor">
-            <a:schemeClr val="lt1"/>
-          </a:fontRef>
-        </p:style>
-        <p:txBody>
-          <a:bodyPr rtlCol="0" anchor="ctr"/>
-          <a:lstStyle/>
-          <a:p>
-            <a:r>
-              <a:rPr lang="en-US" sz="1200" b="1" dirty="0">
-                <a:ln w="0"/>
-                <a:solidFill>
-                  <a:schemeClr val="tx1"/>
-                </a:solidFill>
-              </a:rPr>
-              <a:t>Step 7: Calculate share of imports/exports by region</a:t>
-            </a:r>
-            <a:endParaRPr lang="en-US" sz="1200" dirty="0">
-              <a:ln w="0"/>
-              <a:solidFill>
-                <a:schemeClr val="tx1"/>
-              </a:solidFill>
-            </a:endParaRPr>
-          </a:p>
-        </p:txBody>
-      </p:sp>
-      <p:sp>
-        <p:nvSpPr>
-          <p:cNvPr id="18" name="Rectangle 17">
-            <a:extLst>
-              <a:ext uri="{FF2B5EF4-FFF2-40B4-BE49-F238E27FC236}">
-                <a16:creationId xmlns:a16="http://schemas.microsoft.com/office/drawing/2014/main" id="{9D1C2D2D-DA4F-4419-A4EC-580D16FCCD29}"/>
-              </a:ext>
-            </a:extLst>
-          </p:cNvPr>
-          <p:cNvSpPr/>
-          <p:nvPr/>
-        </p:nvSpPr>
-        <p:spPr>
-          <a:xfrm>
-            <a:off x="7863808" y="4858093"/>
-            <a:ext cx="2734286" cy="326825"/>
-          </a:xfrm>
-          <a:prstGeom prst="rect">
-            <a:avLst/>
-          </a:prstGeom>
-          <a:solidFill>
-            <a:schemeClr val="accent4">
-              <a:lumMod val="20000"/>
-              <a:lumOff val="80000"/>
-            </a:schemeClr>
-          </a:solidFill>
-          <a:ln>
-            <a:solidFill>
-              <a:schemeClr val="accent4">
-                <a:lumMod val="50000"/>
-              </a:schemeClr>
-            </a:solidFill>
-          </a:ln>
-        </p:spPr>
-        <p:style>
-          <a:lnRef idx="2">
-            <a:schemeClr val="accent1">
-              <a:shade val="50000"/>
-            </a:schemeClr>
-          </a:lnRef>
-          <a:fillRef idx="1">
-            <a:schemeClr val="accent1"/>
-          </a:fillRef>
-          <a:effectRef idx="0">
-            <a:schemeClr val="accent1"/>
-          </a:effectRef>
-          <a:fontRef idx="minor">
-            <a:schemeClr val="lt1"/>
-          </a:fontRef>
-        </p:style>
-        <p:txBody>
-          <a:bodyPr rtlCol="0" anchor="ctr"/>
-          <a:lstStyle/>
-          <a:p>
-            <a:r>
-              <a:rPr lang="en-US" sz="1200" b="1" dirty="0">
-                <a:ln w="0"/>
-                <a:solidFill>
-                  <a:schemeClr val="tx1"/>
-                </a:solidFill>
-              </a:rPr>
-              <a:t>Step 8: Identify primary ports by region</a:t>
-            </a:r>
-          </a:p>
-        </p:txBody>
-      </p:sp>
-    </p:spTree>
-    <p:extLst>
-      <p:ext uri="{BB962C8B-B14F-4D97-AF65-F5344CB8AC3E}">
-        <p14:creationId xmlns:p14="http://schemas.microsoft.com/office/powerpoint/2010/main" val="3990479028"/>
-      </p:ext>
-    </p:extLst>
-  </p:cSld>
-  <p:clrMapOvr>
-    <a:masterClrMapping/>
-  </p:clrMapOvr>
-</p:sld>
-</file>
-
-<file path=ppt/slides/slide4.xml><?xml version="1.0" encoding="utf-8"?>
-<p:sld xmlns:a="http://schemas.openxmlformats.org/drawingml/2006/main" xmlns:r="http://schemas.openxmlformats.org/officeDocument/2006/relationships" xmlns:p="http://schemas.openxmlformats.org/presentationml/2006/main">
-  <p:cSld>
-    <p:spTree>
-      <p:nvGrpSpPr>
-        <p:cNvPr id="1" name=""/>
-        <p:cNvGrpSpPr/>
-        <p:nvPr/>
-      </p:nvGrpSpPr>
-      <p:grpSpPr>
-        <a:xfrm>
-          <a:off x="0" y="0"/>
-          <a:ext cx="0" cy="0"/>
-          <a:chOff x="0" y="0"/>
-          <a:chExt cx="0" cy="0"/>
-        </a:xfrm>
-      </p:grpSpPr>
-      <p:sp>
-        <p:nvSpPr>
-          <p:cNvPr id="2" name="Title 1">
-            <a:extLst>
-              <a:ext uri="{FF2B5EF4-FFF2-40B4-BE49-F238E27FC236}">
-                <a16:creationId xmlns:a16="http://schemas.microsoft.com/office/drawing/2014/main" id="{7F497429-F8E1-451C-B6CC-5CB9761515B2}"/>
-              </a:ext>
-            </a:extLst>
-          </p:cNvPr>
-          <p:cNvSpPr>
-            <a:spLocks noGrp="1"/>
-          </p:cNvSpPr>
-          <p:nvPr>
-            <p:ph type="title"/>
-          </p:nvPr>
-        </p:nvSpPr>
-        <p:spPr/>
-        <p:txBody>
-          <a:bodyPr/>
-          <a:lstStyle/>
-          <a:p>
-            <a:r>
-              <a:rPr lang="en-US" dirty="0"/>
-              <a:t>Shortest path algorithm (detailed)</a:t>
-            </a:r>
-            <a:endParaRPr lang="en-AT" dirty="0"/>
-          </a:p>
-        </p:txBody>
-      </p:sp>
-      <p:sp>
-        <p:nvSpPr>
-          <p:cNvPr id="6" name="Rectangle 5">
-            <a:extLst>
-              <a:ext uri="{FF2B5EF4-FFF2-40B4-BE49-F238E27FC236}">
-                <a16:creationId xmlns:a16="http://schemas.microsoft.com/office/drawing/2014/main" id="{902F6AA7-36B6-40D6-A568-8566A6458A1D}"/>
-              </a:ext>
-            </a:extLst>
-          </p:cNvPr>
-          <p:cNvSpPr/>
-          <p:nvPr/>
-        </p:nvSpPr>
-        <p:spPr>
-          <a:xfrm>
-            <a:off x="138069" y="3620418"/>
-            <a:ext cx="2365696" cy="755009"/>
-          </a:xfrm>
-          <a:prstGeom prst="rect">
-            <a:avLst/>
-          </a:prstGeom>
-          <a:solidFill>
-            <a:schemeClr val="accent6">
-              <a:lumMod val="20000"/>
-              <a:lumOff val="80000"/>
-            </a:schemeClr>
-          </a:solidFill>
-          <a:ln>
-            <a:solidFill>
-              <a:schemeClr val="accent6">
-                <a:lumMod val="75000"/>
-              </a:schemeClr>
-            </a:solidFill>
-          </a:ln>
-        </p:spPr>
-        <p:style>
-          <a:lnRef idx="2">
-            <a:schemeClr val="accent1">
-              <a:shade val="50000"/>
-            </a:schemeClr>
-          </a:lnRef>
-          <a:fillRef idx="1">
-            <a:schemeClr val="accent1"/>
-          </a:fillRef>
-          <a:effectRef idx="0">
-            <a:schemeClr val="accent1"/>
-          </a:effectRef>
-          <a:fontRef idx="minor">
-            <a:schemeClr val="lt1"/>
-          </a:fontRef>
-        </p:style>
-        <p:txBody>
-          <a:bodyPr rtlCol="0" anchor="ctr"/>
-          <a:lstStyle/>
-          <a:p>
-            <a:r>
-              <a:rPr lang="en-US" sz="1200" b="1" dirty="0">
-                <a:ln w="0"/>
-                <a:solidFill>
-                  <a:schemeClr val="tx1"/>
-                </a:solidFill>
-              </a:rPr>
-              <a:t>User inputs: </a:t>
-            </a:r>
-          </a:p>
-          <a:p>
-            <a:pPr marL="171450" indent="-171450">
-              <a:buFont typeface="Arial" panose="020B0604020202020204" pitchFamily="34" charset="0"/>
-              <a:buChar char="•"/>
-            </a:pPr>
-            <a:r>
-              <a:rPr lang="en-US" sz="1200" dirty="0">
-                <a:ln w="0"/>
-                <a:solidFill>
-                  <a:schemeClr val="tx1"/>
-                </a:solidFill>
-              </a:rPr>
-              <a:t>Seaports of interest (csv file)</a:t>
-            </a:r>
-          </a:p>
-          <a:p>
-            <a:pPr marL="171450" indent="-171450">
-              <a:buFont typeface="Arial" panose="020B0604020202020204" pitchFamily="34" charset="0"/>
-              <a:buChar char="•"/>
-            </a:pPr>
-            <a:r>
-              <a:rPr lang="en-US" sz="1200" dirty="0">
-                <a:ln w="0"/>
-                <a:solidFill>
-                  <a:schemeClr val="tx1"/>
-                </a:solidFill>
-              </a:rPr>
-              <a:t>Level of node granularity (value)</a:t>
-            </a:r>
-          </a:p>
-          <a:p>
-            <a:pPr marL="171450" indent="-171450">
-              <a:buFont typeface="Arial" panose="020B0604020202020204" pitchFamily="34" charset="0"/>
-              <a:buChar char="•"/>
-            </a:pPr>
-            <a:r>
-              <a:rPr lang="en-US" sz="1200" dirty="0">
-                <a:ln w="0"/>
-                <a:solidFill>
-                  <a:schemeClr val="tx1"/>
-                </a:solidFill>
-              </a:rPr>
-              <a:t>Regional specification (csv file)</a:t>
-            </a:r>
-            <a:endParaRPr lang="en-AT" sz="1200" dirty="0">
-              <a:ln w="0"/>
-              <a:solidFill>
-                <a:schemeClr val="tx1"/>
-              </a:solidFill>
-            </a:endParaRPr>
-          </a:p>
-        </p:txBody>
-      </p:sp>
-      <mc:AlternateContent xmlns:mc="http://schemas.openxmlformats.org/markup-compatibility/2006">
-        <mc:Choice xmlns:a14="http://schemas.microsoft.com/office/drawing/2010/main" Requires="a14">
+      <mc:AlternateContent xmlns:mc="http://schemas.openxmlformats.org/markup-compatibility/2006" xmlns:a14="http://schemas.microsoft.com/office/drawing/2010/main">
+        <mc:Choice Requires="a14">
           <p:sp>
             <p:nvSpPr>
               <p:cNvPr id="7" name="Rectangle 6">
@@ -4620,7 +4060,7 @@
             </p:txBody>
           </p:sp>
         </mc:Choice>
-        <mc:Fallback>
+        <mc:Fallback xmlns="">
           <p:sp>
             <p:nvSpPr>
               <p:cNvPr id="7" name="Rectangle 6">
@@ -4672,8 +4112,8 @@
           </p:sp>
         </mc:Fallback>
       </mc:AlternateContent>
-      <mc:AlternateContent xmlns:mc="http://schemas.openxmlformats.org/markup-compatibility/2006">
-        <mc:Choice xmlns:a14="http://schemas.microsoft.com/office/drawing/2010/main" Requires="a14">
+      <mc:AlternateContent xmlns:mc="http://schemas.openxmlformats.org/markup-compatibility/2006" xmlns:a14="http://schemas.microsoft.com/office/drawing/2010/main">
+        <mc:Choice Requires="a14">
           <p:sp>
             <p:nvSpPr>
               <p:cNvPr id="8" name="Rectangle 7">
@@ -4814,7 +4254,7 @@
             </p:txBody>
           </p:sp>
         </mc:Choice>
-        <mc:Fallback>
+        <mc:Fallback xmlns="">
           <p:sp>
             <p:nvSpPr>
               <p:cNvPr id="8" name="Rectangle 7">
@@ -4866,8 +4306,8 @@
           </p:sp>
         </mc:Fallback>
       </mc:AlternateContent>
-      <mc:AlternateContent xmlns:mc="http://schemas.openxmlformats.org/markup-compatibility/2006">
-        <mc:Choice xmlns:a14="http://schemas.microsoft.com/office/drawing/2010/main" Requires="a14">
+      <mc:AlternateContent xmlns:mc="http://schemas.openxmlformats.org/markup-compatibility/2006" xmlns:a14="http://schemas.microsoft.com/office/drawing/2010/main">
+        <mc:Choice Requires="a14">
           <p:sp>
             <p:nvSpPr>
               <p:cNvPr id="9" name="Rectangle 8">
@@ -5094,7 +4534,7 @@
             </p:txBody>
           </p:sp>
         </mc:Choice>
-        <mc:Fallback>
+        <mc:Fallback xmlns="">
           <p:sp>
             <p:nvSpPr>
               <p:cNvPr id="9" name="Rectangle 8">
@@ -5146,8 +4586,8 @@
           </p:sp>
         </mc:Fallback>
       </mc:AlternateContent>
-      <mc:AlternateContent xmlns:mc="http://schemas.openxmlformats.org/markup-compatibility/2006">
-        <mc:Choice xmlns:a14="http://schemas.microsoft.com/office/drawing/2010/main" Requires="a14">
+      <mc:AlternateContent xmlns:mc="http://schemas.openxmlformats.org/markup-compatibility/2006" xmlns:a14="http://schemas.microsoft.com/office/drawing/2010/main">
+        <mc:Choice Requires="a14">
           <p:sp>
             <p:nvSpPr>
               <p:cNvPr id="10" name="Rectangle 9">
@@ -5326,7 +4766,7 @@
             </p:txBody>
           </p:sp>
         </mc:Choice>
-        <mc:Fallback>
+        <mc:Fallback xmlns="">
           <p:sp>
             <p:nvSpPr>
               <p:cNvPr id="10" name="Rectangle 9">
@@ -5378,8 +4818,8 @@
           </p:sp>
         </mc:Fallback>
       </mc:AlternateContent>
-      <mc:AlternateContent xmlns:mc="http://schemas.openxmlformats.org/markup-compatibility/2006">
-        <mc:Choice xmlns:a14="http://schemas.microsoft.com/office/drawing/2010/main" Requires="a14">
+      <mc:AlternateContent xmlns:mc="http://schemas.openxmlformats.org/markup-compatibility/2006" xmlns:a14="http://schemas.microsoft.com/office/drawing/2010/main">
+        <mc:Choice Requires="a14">
           <p:sp>
             <p:nvSpPr>
               <p:cNvPr id="14" name="Rectangle 13">
@@ -5615,7 +5055,7 @@
             </p:txBody>
           </p:sp>
         </mc:Choice>
-        <mc:Fallback>
+        <mc:Fallback xmlns="">
           <p:sp>
             <p:nvSpPr>
               <p:cNvPr id="14" name="Rectangle 13">
@@ -5730,7 +5170,7 @@
                       <a:schemeClr val="tx1"/>
                     </a:solidFill>
                   </a:rPr>
-                  <a:t>Step 6: Calculate total trade to/from port</a:t>
+                  <a:t>Step 6: Calculate total trade between regions</a:t>
                 </a:r>
                 <a:endParaRPr lang="en-US" sz="1200" dirty="0">
                   <a:ln w="0"/>
@@ -5760,6 +5200,29 @@
                         <a:latin typeface="Cambria Math" panose="02040503050406030204" pitchFamily="18" charset="0"/>
                       </a:rPr>
                       <m:t>𝑘</m:t>
+                    </m:r>
+                  </m:oMath>
+                </a14:m>
+                <a:r>
+                  <a:rPr lang="en-US" sz="1200" u="sng" dirty="0">
+                    <a:ln w="0"/>
+                    <a:solidFill>
+                      <a:schemeClr val="tx1"/>
+                    </a:solidFill>
+                  </a:rPr>
+                  <a:t> and region </a:t>
+                </a:r>
+                <a14:m>
+                  <m:oMath xmlns:m="http://schemas.openxmlformats.org/officeDocument/2006/math">
+                    <m:r>
+                      <a:rPr lang="en-US" sz="1200" b="0" i="1" u="sng" smtClean="0">
+                        <a:ln w="0"/>
+                        <a:solidFill>
+                          <a:schemeClr val="tx1"/>
+                        </a:solidFill>
+                        <a:latin typeface="Cambria Math" panose="02040503050406030204" pitchFamily="18" charset="0"/>
+                      </a:rPr>
+                      <m:t>𝑟</m:t>
                     </m:r>
                   </m:oMath>
                 </a14:m>
@@ -5934,6 +5397,26 @@
                       </m:e>
                       <m:sub>
                         <m:r>
+                          <a:rPr lang="en-US" sz="1200" b="0" i="1" smtClean="0">
+                            <a:ln w="0"/>
+                            <a:solidFill>
+                              <a:schemeClr val="tx1"/>
+                            </a:solidFill>
+                            <a:latin typeface="Cambria Math" panose="02040503050406030204" pitchFamily="18" charset="0"/>
+                          </a:rPr>
+                          <m:t>𝑟</m:t>
+                        </m:r>
+                        <m:r>
+                          <a:rPr lang="en-US" sz="1200" b="0" i="1" smtClean="0">
+                            <a:ln w="0"/>
+                            <a:solidFill>
+                              <a:schemeClr val="tx1"/>
+                            </a:solidFill>
+                            <a:latin typeface="Cambria Math" panose="02040503050406030204" pitchFamily="18" charset="0"/>
+                          </a:rPr>
+                          <m:t>→</m:t>
+                        </m:r>
+                        <m:r>
                           <a:rPr lang="en-US" sz="1200" i="1">
                             <a:ln w="0"/>
                             <a:solidFill>
@@ -5992,6 +5475,26 @@
                             <a:latin typeface="Cambria Math" panose="02040503050406030204" pitchFamily="18" charset="0"/>
                           </a:rPr>
                           <m:t>𝑝𝑘𝑡</m:t>
+                        </m:r>
+                        <m:r>
+                          <a:rPr lang="en-US" sz="1200" b="0" i="1" smtClean="0">
+                            <a:ln w="0"/>
+                            <a:solidFill>
+                              <a:schemeClr val="tx1"/>
+                            </a:solidFill>
+                            <a:latin typeface="Cambria Math" panose="02040503050406030204" pitchFamily="18" charset="0"/>
+                          </a:rPr>
+                          <m:t>→</m:t>
+                        </m:r>
+                        <m:r>
+                          <a:rPr lang="en-US" sz="1200" b="0" i="1" smtClean="0">
+                            <a:ln w="0"/>
+                            <a:solidFill>
+                              <a:schemeClr val="tx1"/>
+                            </a:solidFill>
+                            <a:latin typeface="Cambria Math" panose="02040503050406030204" pitchFamily="18" charset="0"/>
+                          </a:rPr>
+                          <m:t>𝑟</m:t>
                         </m:r>
                       </m:sub>
                     </m:sSub>
@@ -6062,8 +5565,8 @@
           </p:sp>
         </mc:Fallback>
       </mc:AlternateContent>
-      <mc:AlternateContent xmlns:mc="http://schemas.openxmlformats.org/markup-compatibility/2006">
-        <mc:Choice xmlns:a14="http://schemas.microsoft.com/office/drawing/2010/main" Requires="a14">
+      <mc:AlternateContent xmlns:mc="http://schemas.openxmlformats.org/markup-compatibility/2006" xmlns:a14="http://schemas.microsoft.com/office/drawing/2010/main">
+        <mc:Choice Requires="a14">
           <p:sp>
             <p:nvSpPr>
               <p:cNvPr id="17" name="Rectangle 16">
@@ -6817,7 +6320,7 @@
             </p:txBody>
           </p:sp>
         </mc:Choice>
-        <mc:Fallback>
+        <mc:Fallback xmlns="">
           <p:sp>
             <p:nvSpPr>
               <p:cNvPr id="17" name="Rectangle 16">
@@ -6869,8 +6372,8 @@
           </p:sp>
         </mc:Fallback>
       </mc:AlternateContent>
-      <mc:AlternateContent xmlns:mc="http://schemas.openxmlformats.org/markup-compatibility/2006">
-        <mc:Choice xmlns:a14="http://schemas.microsoft.com/office/drawing/2010/main" Requires="a14">
+      <mc:AlternateContent xmlns:mc="http://schemas.openxmlformats.org/markup-compatibility/2006" xmlns:a14="http://schemas.microsoft.com/office/drawing/2010/main">
+        <mc:Choice Requires="a14">
           <p:sp>
             <p:nvSpPr>
               <p:cNvPr id="18" name="Rectangle 17">
@@ -7182,7 +6685,7 @@
             </p:txBody>
           </p:sp>
         </mc:Choice>
-        <mc:Fallback>
+        <mc:Fallback xmlns="">
           <p:sp>
             <p:nvSpPr>
               <p:cNvPr id="18" name="Rectangle 17">
@@ -7238,6 +6741,273 @@
     <p:extLst>
       <p:ext uri="{BB962C8B-B14F-4D97-AF65-F5344CB8AC3E}">
         <p14:creationId xmlns:p14="http://schemas.microsoft.com/office/powerpoint/2010/main" val="1053500759"/>
+      </p:ext>
+    </p:extLst>
+  </p:cSld>
+  <p:clrMapOvr>
+    <a:masterClrMapping/>
+  </p:clrMapOvr>
+</p:sld>
+</file>
+
+<file path=ppt/slides/slide5.xml><?xml version="1.0" encoding="utf-8"?>
+<p:sld xmlns:a="http://schemas.openxmlformats.org/drawingml/2006/main" xmlns:r="http://schemas.openxmlformats.org/officeDocument/2006/relationships" xmlns:p="http://schemas.openxmlformats.org/presentationml/2006/main">
+  <p:cSld>
+    <p:spTree>
+      <p:nvGrpSpPr>
+        <p:cNvPr id="1" name=""/>
+        <p:cNvGrpSpPr/>
+        <p:nvPr/>
+      </p:nvGrpSpPr>
+      <p:grpSpPr>
+        <a:xfrm>
+          <a:off x="0" y="0"/>
+          <a:ext cx="0" cy="0"/>
+          <a:chOff x="0" y="0"/>
+          <a:chExt cx="0" cy="0"/>
+        </a:xfrm>
+      </p:grpSpPr>
+      <p:sp>
+        <p:nvSpPr>
+          <p:cNvPr id="2" name="Title 1">
+            <a:extLst>
+              <a:ext uri="{FF2B5EF4-FFF2-40B4-BE49-F238E27FC236}">
+                <a16:creationId xmlns:a16="http://schemas.microsoft.com/office/drawing/2014/main" id="{9E8E574D-F0FD-406C-A703-DE80BCDB20C5}"/>
+              </a:ext>
+            </a:extLst>
+          </p:cNvPr>
+          <p:cNvSpPr>
+            <a:spLocks noGrp="1"/>
+          </p:cNvSpPr>
+          <p:nvPr>
+            <p:ph type="title"/>
+          </p:nvPr>
+        </p:nvSpPr>
+        <p:spPr/>
+        <p:txBody>
+          <a:bodyPr/>
+          <a:lstStyle/>
+          <a:p>
+            <a:r>
+              <a:rPr lang="en-US" dirty="0"/>
+              <a:t>Exporting ports, by region</a:t>
+            </a:r>
+            <a:endParaRPr lang="en-AT" dirty="0"/>
+          </a:p>
+        </p:txBody>
+      </p:sp>
+      <p:pic>
+        <p:nvPicPr>
+          <p:cNvPr id="4" name="Picture 3">
+            <a:extLst>
+              <a:ext uri="{FF2B5EF4-FFF2-40B4-BE49-F238E27FC236}">
+                <a16:creationId xmlns:a16="http://schemas.microsoft.com/office/drawing/2014/main" id="{D5CE1A39-CC9D-48FE-B84B-6F6B69FEB42A}"/>
+              </a:ext>
+            </a:extLst>
+          </p:cNvPr>
+          <p:cNvPicPr>
+            <a:picLocks noChangeAspect="1"/>
+          </p:cNvPicPr>
+          <p:nvPr/>
+        </p:nvPicPr>
+        <p:blipFill>
+          <a:blip r:embed="rId2"/>
+          <a:stretch>
+            <a:fillRect/>
+          </a:stretch>
+        </p:blipFill>
+        <p:spPr>
+          <a:xfrm>
+            <a:off x="1667312" y="1433770"/>
+            <a:ext cx="8857376" cy="4978959"/>
+          </a:xfrm>
+          <a:prstGeom prst="rect">
+            <a:avLst/>
+          </a:prstGeom>
+        </p:spPr>
+      </p:pic>
+    </p:spTree>
+    <p:extLst>
+      <p:ext uri="{BB962C8B-B14F-4D97-AF65-F5344CB8AC3E}">
+        <p14:creationId xmlns:p14="http://schemas.microsoft.com/office/powerpoint/2010/main" val="2400703649"/>
+      </p:ext>
+    </p:extLst>
+  </p:cSld>
+  <p:clrMapOvr>
+    <a:masterClrMapping/>
+  </p:clrMapOvr>
+</p:sld>
+</file>
+
+<file path=ppt/slides/slide6.xml><?xml version="1.0" encoding="utf-8"?>
+<p:sld xmlns:a="http://schemas.openxmlformats.org/drawingml/2006/main" xmlns:r="http://schemas.openxmlformats.org/officeDocument/2006/relationships" xmlns:p="http://schemas.openxmlformats.org/presentationml/2006/main">
+  <p:cSld>
+    <p:spTree>
+      <p:nvGrpSpPr>
+        <p:cNvPr id="1" name=""/>
+        <p:cNvGrpSpPr/>
+        <p:nvPr/>
+      </p:nvGrpSpPr>
+      <p:grpSpPr>
+        <a:xfrm>
+          <a:off x="0" y="0"/>
+          <a:ext cx="0" cy="0"/>
+          <a:chOff x="0" y="0"/>
+          <a:chExt cx="0" cy="0"/>
+        </a:xfrm>
+      </p:grpSpPr>
+      <p:sp>
+        <p:nvSpPr>
+          <p:cNvPr id="2" name="Title 1">
+            <a:extLst>
+              <a:ext uri="{FF2B5EF4-FFF2-40B4-BE49-F238E27FC236}">
+                <a16:creationId xmlns:a16="http://schemas.microsoft.com/office/drawing/2014/main" id="{9E8E574D-F0FD-406C-A703-DE80BCDB20C5}"/>
+              </a:ext>
+            </a:extLst>
+          </p:cNvPr>
+          <p:cNvSpPr>
+            <a:spLocks noGrp="1"/>
+          </p:cNvSpPr>
+          <p:nvPr>
+            <p:ph type="title"/>
+          </p:nvPr>
+        </p:nvSpPr>
+        <p:spPr/>
+        <p:txBody>
+          <a:bodyPr/>
+          <a:lstStyle/>
+          <a:p>
+            <a:r>
+              <a:rPr lang="en-US" dirty="0"/>
+              <a:t>Importing ports, by region</a:t>
+            </a:r>
+            <a:endParaRPr lang="en-AT" dirty="0"/>
+          </a:p>
+        </p:txBody>
+      </p:sp>
+      <p:pic>
+        <p:nvPicPr>
+          <p:cNvPr id="3" name="Picture 2">
+            <a:extLst>
+              <a:ext uri="{FF2B5EF4-FFF2-40B4-BE49-F238E27FC236}">
+                <a16:creationId xmlns:a16="http://schemas.microsoft.com/office/drawing/2014/main" id="{6DB8020D-9957-49F5-8B3B-7EDED5F83586}"/>
+              </a:ext>
+            </a:extLst>
+          </p:cNvPr>
+          <p:cNvPicPr>
+            <a:picLocks noChangeAspect="1"/>
+          </p:cNvPicPr>
+          <p:nvPr/>
+        </p:nvPicPr>
+        <p:blipFill>
+          <a:blip r:embed="rId2"/>
+          <a:stretch>
+            <a:fillRect/>
+          </a:stretch>
+        </p:blipFill>
+        <p:spPr>
+          <a:xfrm>
+            <a:off x="1612798" y="1508591"/>
+            <a:ext cx="8966403" cy="4984284"/>
+          </a:xfrm>
+          <a:prstGeom prst="rect">
+            <a:avLst/>
+          </a:prstGeom>
+        </p:spPr>
+      </p:pic>
+    </p:spTree>
+    <p:extLst>
+      <p:ext uri="{BB962C8B-B14F-4D97-AF65-F5344CB8AC3E}">
+        <p14:creationId xmlns:p14="http://schemas.microsoft.com/office/powerpoint/2010/main" val="2024492914"/>
+      </p:ext>
+    </p:extLst>
+  </p:cSld>
+  <p:clrMapOvr>
+    <a:masterClrMapping/>
+  </p:clrMapOvr>
+</p:sld>
+</file>
+
+<file path=ppt/slides/slide7.xml><?xml version="1.0" encoding="utf-8"?>
+<p:sld xmlns:a="http://schemas.openxmlformats.org/drawingml/2006/main" xmlns:r="http://schemas.openxmlformats.org/officeDocument/2006/relationships" xmlns:p="http://schemas.openxmlformats.org/presentationml/2006/main">
+  <p:cSld>
+    <p:spTree>
+      <p:nvGrpSpPr>
+        <p:cNvPr id="1" name=""/>
+        <p:cNvGrpSpPr/>
+        <p:nvPr/>
+      </p:nvGrpSpPr>
+      <p:grpSpPr>
+        <a:xfrm>
+          <a:off x="0" y="0"/>
+          <a:ext cx="0" cy="0"/>
+          <a:chOff x="0" y="0"/>
+          <a:chExt cx="0" cy="0"/>
+        </a:xfrm>
+      </p:grpSpPr>
+      <p:sp>
+        <p:nvSpPr>
+          <p:cNvPr id="2" name="Title 1">
+            <a:extLst>
+              <a:ext uri="{FF2B5EF4-FFF2-40B4-BE49-F238E27FC236}">
+                <a16:creationId xmlns:a16="http://schemas.microsoft.com/office/drawing/2014/main" id="{9E8E574D-F0FD-406C-A703-DE80BCDB20C5}"/>
+              </a:ext>
+            </a:extLst>
+          </p:cNvPr>
+          <p:cNvSpPr>
+            <a:spLocks noGrp="1"/>
+          </p:cNvSpPr>
+          <p:nvPr>
+            <p:ph type="title"/>
+          </p:nvPr>
+        </p:nvSpPr>
+        <p:spPr/>
+        <p:txBody>
+          <a:bodyPr/>
+          <a:lstStyle/>
+          <a:p>
+            <a:r>
+              <a:rPr lang="en-US" dirty="0"/>
+              <a:t>Region-region paths</a:t>
+            </a:r>
+            <a:endParaRPr lang="en-AT" dirty="0"/>
+          </a:p>
+        </p:txBody>
+      </p:sp>
+      <p:pic>
+        <p:nvPicPr>
+          <p:cNvPr id="3" name="Picture 2">
+            <a:extLst>
+              <a:ext uri="{FF2B5EF4-FFF2-40B4-BE49-F238E27FC236}">
+                <a16:creationId xmlns:a16="http://schemas.microsoft.com/office/drawing/2014/main" id="{14D31B31-AE74-4069-B97C-A669C14677D2}"/>
+              </a:ext>
+            </a:extLst>
+          </p:cNvPr>
+          <p:cNvPicPr>
+            <a:picLocks noChangeAspect="1"/>
+          </p:cNvPicPr>
+          <p:nvPr/>
+        </p:nvPicPr>
+        <p:blipFill>
+          <a:blip r:embed="rId2"/>
+          <a:stretch>
+            <a:fillRect/>
+          </a:stretch>
+        </p:blipFill>
+        <p:spPr>
+          <a:xfrm>
+            <a:off x="1549737" y="1580654"/>
+            <a:ext cx="9092526" cy="5051403"/>
+          </a:xfrm>
+          <a:prstGeom prst="rect">
+            <a:avLst/>
+          </a:prstGeom>
+        </p:spPr>
+      </p:pic>
+    </p:spTree>
+    <p:extLst>
+      <p:ext uri="{BB962C8B-B14F-4D97-AF65-F5344CB8AC3E}">
+        <p14:creationId xmlns:p14="http://schemas.microsoft.com/office/powerpoint/2010/main" val="1673213880"/>
       </p:ext>
     </p:extLst>
   </p:cSld>

</xml_diff>